<commit_message>
Update UI component in Developer Guide
</commit_message>
<xml_diff>
--- a/docs/diagrams/Diagrams-UI.pptx
+++ b/docs/diagrams/Diagrams-UI.pptx
@@ -208,7 +208,7 @@
           <a:p>
             <a:fld id="{F5CC4B3F-88C1-4FFA-B1B6-F41C21DC6924}" type="datetimeFigureOut">
               <a:rPr lang="en-US" smtClean="0"/>
-              <a:t>10/25/2016</a:t>
+              <a:t>11/5/2016</a:t>
             </a:fld>
             <a:endParaRPr lang="en-US"/>
           </a:p>
@@ -654,7 +654,7 @@
           <a:p>
             <a:fld id="{78C97017-6FC3-485B-9764-EAC9E56C1D49}" type="datetimeFigureOut">
               <a:rPr lang="en-US" smtClean="0"/>
-              <a:t>10/25/2016</a:t>
+              <a:t>11/5/2016</a:t>
             </a:fld>
             <a:endParaRPr lang="en-US"/>
           </a:p>
@@ -822,7 +822,7 @@
           <a:p>
             <a:fld id="{78C97017-6FC3-485B-9764-EAC9E56C1D49}" type="datetimeFigureOut">
               <a:rPr lang="en-US" smtClean="0"/>
-              <a:t>10/25/2016</a:t>
+              <a:t>11/5/2016</a:t>
             </a:fld>
             <a:endParaRPr lang="en-US"/>
           </a:p>
@@ -1000,7 +1000,7 @@
           <a:p>
             <a:fld id="{78C97017-6FC3-485B-9764-EAC9E56C1D49}" type="datetimeFigureOut">
               <a:rPr lang="en-US" smtClean="0"/>
-              <a:t>10/25/2016</a:t>
+              <a:t>11/5/2016</a:t>
             </a:fld>
             <a:endParaRPr lang="en-US"/>
           </a:p>
@@ -1168,7 +1168,7 @@
           <a:p>
             <a:fld id="{78C97017-6FC3-485B-9764-EAC9E56C1D49}" type="datetimeFigureOut">
               <a:rPr lang="en-US" smtClean="0"/>
-              <a:t>10/25/2016</a:t>
+              <a:t>11/5/2016</a:t>
             </a:fld>
             <a:endParaRPr lang="en-US"/>
           </a:p>
@@ -1413,7 +1413,7 @@
           <a:p>
             <a:fld id="{78C97017-6FC3-485B-9764-EAC9E56C1D49}" type="datetimeFigureOut">
               <a:rPr lang="en-US" smtClean="0"/>
-              <a:t>10/25/2016</a:t>
+              <a:t>11/5/2016</a:t>
             </a:fld>
             <a:endParaRPr lang="en-US"/>
           </a:p>
@@ -1698,7 +1698,7 @@
           <a:p>
             <a:fld id="{78C97017-6FC3-485B-9764-EAC9E56C1D49}" type="datetimeFigureOut">
               <a:rPr lang="en-US" smtClean="0"/>
-              <a:t>10/25/2016</a:t>
+              <a:t>11/5/2016</a:t>
             </a:fld>
             <a:endParaRPr lang="en-US"/>
           </a:p>
@@ -2117,7 +2117,7 @@
           <a:p>
             <a:fld id="{78C97017-6FC3-485B-9764-EAC9E56C1D49}" type="datetimeFigureOut">
               <a:rPr lang="en-US" smtClean="0"/>
-              <a:t>10/25/2016</a:t>
+              <a:t>11/5/2016</a:t>
             </a:fld>
             <a:endParaRPr lang="en-US"/>
           </a:p>
@@ -2234,7 +2234,7 @@
           <a:p>
             <a:fld id="{78C97017-6FC3-485B-9764-EAC9E56C1D49}" type="datetimeFigureOut">
               <a:rPr lang="en-US" smtClean="0"/>
-              <a:t>10/25/2016</a:t>
+              <a:t>11/5/2016</a:t>
             </a:fld>
             <a:endParaRPr lang="en-US"/>
           </a:p>
@@ -2329,7 +2329,7 @@
           <a:p>
             <a:fld id="{78C97017-6FC3-485B-9764-EAC9E56C1D49}" type="datetimeFigureOut">
               <a:rPr lang="en-US" smtClean="0"/>
-              <a:t>10/25/2016</a:t>
+              <a:t>11/5/2016</a:t>
             </a:fld>
             <a:endParaRPr lang="en-US"/>
           </a:p>
@@ -2604,7 +2604,7 @@
           <a:p>
             <a:fld id="{78C97017-6FC3-485B-9764-EAC9E56C1D49}" type="datetimeFigureOut">
               <a:rPr lang="en-US" smtClean="0"/>
-              <a:t>10/25/2016</a:t>
+              <a:t>11/5/2016</a:t>
             </a:fld>
             <a:endParaRPr lang="en-US"/>
           </a:p>
@@ -2856,7 +2856,7 @@
           <a:p>
             <a:fld id="{78C97017-6FC3-485B-9764-EAC9E56C1D49}" type="datetimeFigureOut">
               <a:rPr lang="en-US" smtClean="0"/>
-              <a:t>10/25/2016</a:t>
+              <a:t>11/5/2016</a:t>
             </a:fld>
             <a:endParaRPr lang="en-US"/>
           </a:p>
@@ -3067,7 +3067,7 @@
           <a:p>
             <a:fld id="{78C97017-6FC3-485B-9764-EAC9E56C1D49}" type="datetimeFigureOut">
               <a:rPr lang="en-US" smtClean="0"/>
-              <a:t>10/25/2016</a:t>
+              <a:t>11/5/2016</a:t>
             </a:fld>
             <a:endParaRPr lang="en-US"/>
           </a:p>
@@ -3450,8 +3450,8 @@
         </p:nvSpPr>
         <p:spPr>
           <a:xfrm>
-            <a:off x="1217465" y="1447800"/>
-            <a:ext cx="4917083" cy="4648200"/>
+            <a:off x="1217465" y="381000"/>
+            <a:ext cx="4917083" cy="4876800"/>
           </a:xfrm>
           <a:prstGeom prst="roundRect">
             <a:avLst>
@@ -3512,7 +3512,7 @@
         </p:nvSpPr>
         <p:spPr>
           <a:xfrm>
-            <a:off x="2095948" y="2341220"/>
+            <a:off x="2095948" y="1274420"/>
             <a:ext cx="1093635" cy="346760"/>
           </a:xfrm>
           <a:prstGeom prst="rect">
@@ -3572,7 +3572,7 @@
         </p:nvSpPr>
         <p:spPr>
           <a:xfrm>
-            <a:off x="2592528" y="3179160"/>
+            <a:off x="2592528" y="2112360"/>
             <a:ext cx="1093635" cy="236841"/>
           </a:xfrm>
           <a:prstGeom prst="rect">
@@ -3632,7 +3632,7 @@
         </p:nvSpPr>
         <p:spPr>
           <a:xfrm>
-            <a:off x="2092842" y="1770924"/>
+            <a:off x="2092842" y="704124"/>
             <a:ext cx="1093635" cy="346760"/>
           </a:xfrm>
           <a:prstGeom prst="rect">
@@ -3694,7 +3694,7 @@
         </p:nvCxnSpPr>
         <p:spPr>
           <a:xfrm rot="16200000" flipH="1">
-            <a:off x="2529445" y="2227899"/>
+            <a:off x="2529445" y="1161099"/>
             <a:ext cx="223536" cy="3106"/>
           </a:xfrm>
           <a:prstGeom prst="bentConnector3">
@@ -3734,7 +3734,7 @@
         </p:nvSpPr>
         <p:spPr>
           <a:xfrm rot="10800000" flipV="1">
-            <a:off x="5394717" y="2110477"/>
+            <a:off x="5394717" y="1043677"/>
             <a:ext cx="270504" cy="175523"/>
           </a:xfrm>
           <a:prstGeom prst="triangle">
@@ -3782,7 +3782,7 @@
         </p:nvCxnSpPr>
         <p:spPr>
           <a:xfrm flipV="1">
-            <a:off x="644735" y="2991937"/>
+            <a:off x="644735" y="1925137"/>
             <a:ext cx="684904" cy="1"/>
           </a:xfrm>
           <a:prstGeom prst="bentConnector3">
@@ -3825,7 +3825,7 @@
         </p:nvSpPr>
         <p:spPr>
           <a:xfrm rot="16200000">
-            <a:off x="5703829" y="2464877"/>
+            <a:off x="5703829" y="1398077"/>
             <a:ext cx="2362201" cy="328045"/>
           </a:xfrm>
           <a:prstGeom prst="roundRect">
@@ -3885,7 +3885,7 @@
         </p:nvSpPr>
         <p:spPr>
           <a:xfrm>
-            <a:off x="2592527" y="5236559"/>
+            <a:off x="2592527" y="4461538"/>
             <a:ext cx="1093635" cy="236841"/>
           </a:xfrm>
           <a:prstGeom prst="rect">
@@ -3945,7 +3945,7 @@
         </p:nvSpPr>
         <p:spPr>
           <a:xfrm>
-            <a:off x="2592526" y="3733977"/>
+            <a:off x="2592526" y="2667177"/>
             <a:ext cx="1093635" cy="236841"/>
           </a:xfrm>
           <a:prstGeom prst="rect">
@@ -4005,7 +4005,7 @@
         </p:nvSpPr>
         <p:spPr>
           <a:xfrm>
-            <a:off x="3839323" y="3994351"/>
+            <a:off x="3839323" y="2927551"/>
             <a:ext cx="1040906" cy="236841"/>
           </a:xfrm>
           <a:prstGeom prst="rect">
@@ -4065,7 +4065,7 @@
         </p:nvSpPr>
         <p:spPr>
           <a:xfrm>
-            <a:off x="2592528" y="5638800"/>
+            <a:off x="2592528" y="4863779"/>
             <a:ext cx="1093635" cy="236841"/>
           </a:xfrm>
           <a:prstGeom prst="rect">
@@ -4125,7 +4125,7 @@
         </p:nvSpPr>
         <p:spPr>
           <a:xfrm>
-            <a:off x="2324548" y="2706452"/>
+            <a:off x="2324548" y="1639652"/>
             <a:ext cx="183156" cy="161573"/>
           </a:xfrm>
           <a:prstGeom prst="flowChartDecision">
@@ -4176,7 +4176,7 @@
         </p:nvCxnSpPr>
         <p:spPr>
           <a:xfrm rot="16200000" flipH="1">
-            <a:off x="2289549" y="2994602"/>
+            <a:off x="2289549" y="1927802"/>
             <a:ext cx="429556" cy="176402"/>
           </a:xfrm>
           <a:prstGeom prst="bentConnector2">
@@ -4214,7 +4214,7 @@
         </p:nvSpPr>
         <p:spPr>
           <a:xfrm>
-            <a:off x="3759694" y="3416961"/>
+            <a:off x="3759694" y="2350161"/>
             <a:ext cx="1040906" cy="236841"/>
           </a:xfrm>
           <a:prstGeom prst="rect">
@@ -4277,7 +4277,7 @@
         </p:nvCxnSpPr>
         <p:spPr>
           <a:xfrm rot="16200000" flipH="1">
-            <a:off x="2012140" y="3272011"/>
+            <a:off x="2012140" y="2205211"/>
             <a:ext cx="984373" cy="176400"/>
           </a:xfrm>
           <a:prstGeom prst="bentConnector2">
@@ -4318,8 +4318,8 @@
         </p:nvCxnSpPr>
         <p:spPr>
           <a:xfrm rot="16200000" flipH="1">
-            <a:off x="1260849" y="4023301"/>
-            <a:ext cx="2486955" cy="176401"/>
+            <a:off x="1114959" y="3102391"/>
+            <a:ext cx="2778734" cy="176401"/>
           </a:xfrm>
           <a:prstGeom prst="bentConnector2">
             <a:avLst/>
@@ -4358,8 +4358,8 @@
         </p:nvCxnSpPr>
         <p:spPr>
           <a:xfrm rot="16200000" flipH="1">
-            <a:off x="862481" y="4027173"/>
-            <a:ext cx="3069239" cy="390855"/>
+            <a:off x="719007" y="3108679"/>
+            <a:ext cx="3361018" cy="386024"/>
           </a:xfrm>
           <a:prstGeom prst="bentConnector2">
             <a:avLst/>
@@ -4396,7 +4396,7 @@
         </p:nvSpPr>
         <p:spPr>
           <a:xfrm>
-            <a:off x="5143948" y="1770924"/>
+            <a:off x="5143948" y="704124"/>
             <a:ext cx="772043" cy="346760"/>
           </a:xfrm>
           <a:prstGeom prst="rect">
@@ -4478,7 +4478,7 @@
         </p:nvCxnSpPr>
         <p:spPr>
           <a:xfrm flipV="1">
-            <a:off x="4800600" y="2286000"/>
+            <a:off x="4800600" y="1219200"/>
             <a:ext cx="729369" cy="1249382"/>
           </a:xfrm>
           <a:prstGeom prst="bentConnector2">
@@ -4519,7 +4519,7 @@
         </p:nvCxnSpPr>
         <p:spPr>
           <a:xfrm rot="5400000">
-            <a:off x="4291713" y="2874516"/>
+            <a:off x="4291713" y="1807716"/>
             <a:ext cx="1826772" cy="649740"/>
           </a:xfrm>
           <a:prstGeom prst="bentConnector2">
@@ -4560,7 +4560,7 @@
         </p:nvCxnSpPr>
         <p:spPr>
           <a:xfrm flipV="1">
-            <a:off x="3189583" y="2286000"/>
+            <a:off x="3189583" y="1219200"/>
             <a:ext cx="2340386" cy="228600"/>
           </a:xfrm>
           <a:prstGeom prst="bentConnector2">
@@ -4601,8 +4601,8 @@
         </p:nvCxnSpPr>
         <p:spPr>
           <a:xfrm rot="5400000">
-            <a:off x="3073576" y="2898587"/>
-            <a:ext cx="3068980" cy="1843807"/>
+            <a:off x="2927687" y="1977676"/>
+            <a:ext cx="3360759" cy="1843807"/>
           </a:xfrm>
           <a:prstGeom prst="bentConnector2">
             <a:avLst/>
@@ -4642,8 +4642,8 @@
         </p:nvCxnSpPr>
         <p:spPr>
           <a:xfrm rot="5400000">
-            <a:off x="2872456" y="3099707"/>
-            <a:ext cx="3471221" cy="1843806"/>
+            <a:off x="2726566" y="2178797"/>
+            <a:ext cx="3763000" cy="1843806"/>
           </a:xfrm>
           <a:prstGeom prst="bentConnector2">
             <a:avLst/>
@@ -4680,7 +4680,7 @@
         </p:nvSpPr>
         <p:spPr>
           <a:xfrm>
-            <a:off x="3657600" y="1770924"/>
+            <a:off x="3657600" y="704124"/>
             <a:ext cx="1031399" cy="346760"/>
           </a:xfrm>
           <a:prstGeom prst="rect">
@@ -4741,7 +4741,7 @@
         </p:nvCxnSpPr>
         <p:spPr>
           <a:xfrm rot="5400000" flipH="1" flipV="1">
-            <a:off x="4594921" y="-355061"/>
+            <a:off x="4594921" y="-1421861"/>
             <a:ext cx="170724" cy="4081246"/>
           </a:xfrm>
           <a:prstGeom prst="bentConnector2">
@@ -4780,7 +4780,7 @@
         </p:nvCxnSpPr>
         <p:spPr>
           <a:xfrm flipV="1">
-            <a:off x="3198609" y="1944304"/>
+            <a:off x="3198609" y="877504"/>
             <a:ext cx="484448" cy="2308"/>
           </a:xfrm>
           <a:prstGeom prst="straightConnector1">
@@ -4820,7 +4820,7 @@
         </p:nvCxnSpPr>
         <p:spPr>
           <a:xfrm flipV="1">
-            <a:off x="4714456" y="1944304"/>
+            <a:off x="4714456" y="877504"/>
             <a:ext cx="429492" cy="2308"/>
           </a:xfrm>
           <a:prstGeom prst="straightConnector1">
@@ -4859,7 +4859,7 @@
         </p:nvSpPr>
         <p:spPr>
           <a:xfrm rot="16200000">
-            <a:off x="6213739" y="4560376"/>
+            <a:off x="6213739" y="3493576"/>
             <a:ext cx="1371599" cy="328045"/>
           </a:xfrm>
           <a:prstGeom prst="roundRect">
@@ -4919,7 +4919,7 @@
         </p:nvSpPr>
         <p:spPr>
           <a:xfrm rot="16200000">
-            <a:off x="956202" y="2861202"/>
+            <a:off x="956202" y="1794402"/>
             <a:ext cx="1093635" cy="346760"/>
           </a:xfrm>
           <a:prstGeom prst="rect">
@@ -4989,7 +4989,7 @@
         </p:nvSpPr>
         <p:spPr>
           <a:xfrm flipV="1">
-            <a:off x="1367767" y="2286001"/>
+            <a:off x="1367767" y="1219201"/>
             <a:ext cx="270504" cy="175523"/>
           </a:xfrm>
           <a:prstGeom prst="triangle">
@@ -5040,7 +5040,7 @@
         </p:nvCxnSpPr>
         <p:spPr>
           <a:xfrm rot="10800000" flipV="1">
-            <a:off x="1503020" y="1944303"/>
+            <a:off x="1503020" y="877503"/>
             <a:ext cx="589823" cy="341697"/>
           </a:xfrm>
           <a:prstGeom prst="bentConnector2">
@@ -5082,7 +5082,7 @@
         </p:nvCxnSpPr>
         <p:spPr>
           <a:xfrm rot="16200000" flipH="1">
-            <a:off x="3389830" y="3165517"/>
+            <a:off x="3389830" y="2098717"/>
             <a:ext cx="119381" cy="620348"/>
           </a:xfrm>
           <a:prstGeom prst="bentConnector2">
@@ -5123,7 +5123,7 @@
         </p:nvCxnSpPr>
         <p:spPr>
           <a:xfrm rot="5400000">
-            <a:off x="4102276" y="1869887"/>
+            <a:off x="4102276" y="803087"/>
             <a:ext cx="1011581" cy="1843806"/>
           </a:xfrm>
           <a:prstGeom prst="bentConnector2">
@@ -5164,7 +5164,7 @@
         </p:nvCxnSpPr>
         <p:spPr>
           <a:xfrm rot="16200000" flipH="1">
-            <a:off x="3418356" y="3691805"/>
+            <a:off x="3418356" y="2625005"/>
             <a:ext cx="141954" cy="699979"/>
           </a:xfrm>
           <a:prstGeom prst="bentConnector2">
@@ -5205,7 +5205,7 @@
         </p:nvCxnSpPr>
         <p:spPr>
           <a:xfrm rot="5400000">
-            <a:off x="3824866" y="2147295"/>
+            <a:off x="3824866" y="1080495"/>
             <a:ext cx="1566398" cy="1843808"/>
           </a:xfrm>
           <a:prstGeom prst="bentConnector2">
@@ -5243,7 +5243,7 @@
         </p:nvSpPr>
         <p:spPr>
           <a:xfrm>
-            <a:off x="5435896" y="2895600"/>
+            <a:off x="5435896" y="1828800"/>
             <a:ext cx="229325" cy="166560"/>
           </a:xfrm>
           <a:prstGeom prst="rect">
@@ -5296,7 +5296,7 @@
         </p:nvSpPr>
         <p:spPr>
           <a:xfrm>
-            <a:off x="3687515" y="2981202"/>
+            <a:off x="3687515" y="1914402"/>
             <a:ext cx="3048000" cy="203200"/>
           </a:xfrm>
           <a:custGeom>
@@ -5378,7 +5378,7 @@
         </p:nvSpPr>
         <p:spPr>
           <a:xfrm>
-            <a:off x="5435895" y="4251744"/>
+            <a:off x="5435895" y="3184944"/>
             <a:ext cx="229325" cy="160062"/>
           </a:xfrm>
           <a:prstGeom prst="rect">
@@ -5431,7 +5431,7 @@
         </p:nvSpPr>
         <p:spPr>
           <a:xfrm flipV="1">
-            <a:off x="4287130" y="4236802"/>
+            <a:off x="4287130" y="3170002"/>
             <a:ext cx="2469864" cy="94973"/>
           </a:xfrm>
           <a:custGeom>
@@ -5513,7 +5513,7 @@
         </p:nvSpPr>
         <p:spPr>
           <a:xfrm>
-            <a:off x="2582371" y="4418637"/>
+            <a:off x="2582371" y="3643616"/>
             <a:ext cx="1093635" cy="236841"/>
           </a:xfrm>
           <a:prstGeom prst="rect">
@@ -5576,8 +5576,8 @@
         </p:nvCxnSpPr>
         <p:spPr>
           <a:xfrm rot="16200000" flipH="1">
-            <a:off x="1664732" y="3619418"/>
-            <a:ext cx="1669033" cy="166245"/>
+            <a:off x="1518842" y="2698508"/>
+            <a:ext cx="1960812" cy="166245"/>
           </a:xfrm>
           <a:prstGeom prst="bentConnector2">
             <a:avLst/>
@@ -5614,7 +5614,7 @@
         </p:nvSpPr>
         <p:spPr>
           <a:xfrm>
-            <a:off x="5414416" y="4703892"/>
+            <a:off x="5414416" y="3928871"/>
             <a:ext cx="229325" cy="160062"/>
           </a:xfrm>
           <a:prstGeom prst="rect">
@@ -5667,7 +5667,7 @@
         </p:nvSpPr>
         <p:spPr>
           <a:xfrm flipV="1">
-            <a:off x="3566864" y="4670419"/>
+            <a:off x="3566864" y="3895398"/>
             <a:ext cx="3190129" cy="109001"/>
           </a:xfrm>
           <a:custGeom>
@@ -5749,7 +5749,7 @@
         </p:nvSpPr>
         <p:spPr>
           <a:xfrm>
-            <a:off x="3839323" y="4904798"/>
+            <a:off x="3839323" y="4129777"/>
             <a:ext cx="1040906" cy="236841"/>
           </a:xfrm>
           <a:prstGeom prst="rect">
@@ -5812,7 +5812,7 @@
         </p:nvCxnSpPr>
         <p:spPr>
           <a:xfrm rot="16200000" flipH="1">
-            <a:off x="3300386" y="4484281"/>
+            <a:off x="3300386" y="3709260"/>
             <a:ext cx="367741" cy="710134"/>
           </a:xfrm>
           <a:prstGeom prst="bentConnector2">
@@ -5842,6 +5842,242 @@
           </a:fontRef>
         </p:style>
       </p:cxnSp>
+      <p:sp>
+        <p:nvSpPr>
+          <p:cNvPr id="54" name="Rectangle 11"/>
+          <p:cNvSpPr/>
+          <p:nvPr/>
+        </p:nvSpPr>
+        <p:spPr>
+          <a:xfrm>
+            <a:off x="3839322" y="3353720"/>
+            <a:ext cx="1304625" cy="230389"/>
+          </a:xfrm>
+          <a:prstGeom prst="rect">
+            <a:avLst/>
+          </a:prstGeom>
+          <a:ln w="19050">
+            <a:solidFill>
+              <a:schemeClr val="accent3"/>
+            </a:solidFill>
+          </a:ln>
+          <a:effectLst/>
+        </p:spPr>
+        <p:style>
+          <a:lnRef idx="1">
+            <a:schemeClr val="accent3"/>
+          </a:lnRef>
+          <a:fillRef idx="2">
+            <a:schemeClr val="accent3"/>
+          </a:fillRef>
+          <a:effectRef idx="1">
+            <a:schemeClr val="accent3"/>
+          </a:effectRef>
+          <a:fontRef idx="minor">
+            <a:schemeClr val="dk1"/>
+          </a:fontRef>
+        </p:style>
+        <p:txBody>
+          <a:bodyPr rtlCol="0" anchor="ctr"/>
+          <a:lstStyle/>
+          <a:p>
+            <a:pPr algn="ctr"/>
+            <a:r>
+              <a:rPr lang="en-US" sz="1050" b="1" dirty="0" err="1" smtClean="0">
+                <a:solidFill>
+                  <a:schemeClr val="accent3">
+                    <a:lumMod val="75000"/>
+                  </a:schemeClr>
+                </a:solidFill>
+              </a:rPr>
+              <a:t>TaskCardCollapsed</a:t>
+            </a:r>
+            <a:endParaRPr lang="en-SG" sz="1050" b="1" dirty="0">
+              <a:solidFill>
+                <a:schemeClr val="accent3">
+                  <a:lumMod val="75000"/>
+                </a:schemeClr>
+              </a:solidFill>
+            </a:endParaRPr>
+          </a:p>
+        </p:txBody>
+      </p:sp>
+      <p:cxnSp>
+        <p:nvCxnSpPr>
+          <p:cNvPr id="55" name="Elbow Connector 54"/>
+          <p:cNvCxnSpPr>
+            <a:stCxn id="36" idx="2"/>
+            <a:endCxn id="54" idx="1"/>
+          </p:cNvCxnSpPr>
+          <p:nvPr/>
+        </p:nvCxnSpPr>
+        <p:spPr>
+          <a:xfrm rot="16200000" flipH="1">
+            <a:off x="3206885" y="2836477"/>
+            <a:ext cx="564897" cy="699978"/>
+          </a:xfrm>
+          <a:prstGeom prst="bentConnector2">
+            <a:avLst/>
+          </a:prstGeom>
+          <a:ln w="19050">
+            <a:solidFill>
+              <a:schemeClr val="accent3"/>
+            </a:solidFill>
+            <a:headEnd type="none" w="med" len="med"/>
+            <a:tailEnd type="arrow" w="med" len="med"/>
+          </a:ln>
+          <a:effectLst/>
+        </p:spPr>
+        <p:style>
+          <a:lnRef idx="1">
+            <a:schemeClr val="accent2"/>
+          </a:lnRef>
+          <a:fillRef idx="2">
+            <a:schemeClr val="accent2"/>
+          </a:fillRef>
+          <a:effectRef idx="1">
+            <a:schemeClr val="accent2"/>
+          </a:effectRef>
+          <a:fontRef idx="minor">
+            <a:schemeClr val="dk1"/>
+          </a:fontRef>
+        </p:style>
+      </p:cxnSp>
+      <p:sp>
+        <p:nvSpPr>
+          <p:cNvPr id="56" name="Rectangle 55"/>
+          <p:cNvSpPr/>
+          <p:nvPr/>
+        </p:nvSpPr>
+        <p:spPr>
+          <a:xfrm>
+            <a:off x="5435895" y="3611113"/>
+            <a:ext cx="229325" cy="160062"/>
+          </a:xfrm>
+          <a:prstGeom prst="rect">
+            <a:avLst/>
+          </a:prstGeom>
+          <a:solidFill>
+            <a:schemeClr val="accent3">
+              <a:lumMod val="20000"/>
+              <a:lumOff val="80000"/>
+              <a:alpha val="80000"/>
+            </a:schemeClr>
+          </a:solidFill>
+          <a:ln>
+            <a:noFill/>
+          </a:ln>
+          <a:effectLst>
+            <a:softEdge rad="31750"/>
+          </a:effectLst>
+        </p:spPr>
+        <p:style>
+          <a:lnRef idx="2">
+            <a:schemeClr val="accent1">
+              <a:shade val="50000"/>
+            </a:schemeClr>
+          </a:lnRef>
+          <a:fillRef idx="1">
+            <a:schemeClr val="accent1"/>
+          </a:fillRef>
+          <a:effectRef idx="0">
+            <a:schemeClr val="accent1"/>
+          </a:effectRef>
+          <a:fontRef idx="minor">
+            <a:schemeClr val="lt1"/>
+          </a:fontRef>
+        </p:style>
+        <p:txBody>
+          <a:bodyPr rtlCol="0" anchor="ctr"/>
+          <a:lstStyle/>
+          <a:p>
+            <a:pPr algn="ctr"/>
+            <a:endParaRPr lang="en-SG"/>
+          </a:p>
+        </p:txBody>
+      </p:sp>
+      <p:sp>
+        <p:nvSpPr>
+          <p:cNvPr id="57" name="Freeform 56"/>
+          <p:cNvSpPr/>
+          <p:nvPr/>
+        </p:nvSpPr>
+        <p:spPr>
+          <a:xfrm flipV="1">
+            <a:off x="4287130" y="3596171"/>
+            <a:ext cx="2469864" cy="94973"/>
+          </a:xfrm>
+          <a:custGeom>
+            <a:avLst/>
+            <a:gdLst>
+              <a:gd name="connsiteX0" fmla="*/ 0 w 3048000"/>
+              <a:gd name="connsiteY0" fmla="*/ 203200 h 203200"/>
+              <a:gd name="connsiteX1" fmla="*/ 221673 w 3048000"/>
+              <a:gd name="connsiteY1" fmla="*/ 0 h 203200"/>
+              <a:gd name="connsiteX2" fmla="*/ 3048000 w 3048000"/>
+              <a:gd name="connsiteY2" fmla="*/ 0 h 203200"/>
+            </a:gdLst>
+            <a:ahLst/>
+            <a:cxnLst>
+              <a:cxn ang="0">
+                <a:pos x="connsiteX0" y="connsiteY0"/>
+              </a:cxn>
+              <a:cxn ang="0">
+                <a:pos x="connsiteX1" y="connsiteY1"/>
+              </a:cxn>
+              <a:cxn ang="0">
+                <a:pos x="connsiteX2" y="connsiteY2"/>
+              </a:cxn>
+            </a:cxnLst>
+            <a:rect l="l" t="t" r="r" b="b"/>
+            <a:pathLst>
+              <a:path w="3048000" h="203200">
+                <a:moveTo>
+                  <a:pt x="0" y="203200"/>
+                </a:moveTo>
+                <a:lnTo>
+                  <a:pt x="221673" y="0"/>
+                </a:lnTo>
+                <a:lnTo>
+                  <a:pt x="3048000" y="0"/>
+                </a:lnTo>
+              </a:path>
+            </a:pathLst>
+          </a:custGeom>
+          <a:noFill/>
+          <a:ln w="19050">
+            <a:solidFill>
+              <a:schemeClr val="accent3"/>
+            </a:solidFill>
+            <a:prstDash val="sysDot"/>
+            <a:headEnd type="none" w="med" len="med"/>
+            <a:tailEnd type="arrow" w="med" len="med"/>
+          </a:ln>
+          <a:effectLst/>
+        </p:spPr>
+        <p:style>
+          <a:lnRef idx="1">
+            <a:schemeClr val="accent2"/>
+          </a:lnRef>
+          <a:fillRef idx="2">
+            <a:schemeClr val="accent2"/>
+          </a:fillRef>
+          <a:effectRef idx="1">
+            <a:schemeClr val="accent2"/>
+          </a:effectRef>
+          <a:fontRef idx="minor">
+            <a:schemeClr val="dk1"/>
+          </a:fontRef>
+        </p:style>
+        <p:txBody>
+          <a:bodyPr rtlCol="0" anchor="ctr"/>
+          <a:lstStyle/>
+          <a:p>
+            <a:pPr algn="ctr"/>
+            <a:endParaRPr lang="en-SG"/>
+          </a:p>
+        </p:txBody>
+      </p:sp>
     </p:spTree>
     <p:extLst>
       <p:ext uri="{BB962C8B-B14F-4D97-AF65-F5344CB8AC3E}">

</xml_diff>